<commit_message>
Update Wprowadzenie do przedmiotu „Kierunki Rozwoju Telekomunikacji”.pptx
</commit_message>
<xml_diff>
--- a/Kierunki Rozwoju Telekomunikacji/Wprowadzenie do przedmiotu „Kierunki Rozwoju Telekomunikacji”.pptx
+++ b/Kierunki Rozwoju Telekomunikacji/Wprowadzenie do przedmiotu „Kierunki Rozwoju Telekomunikacji”.pptx
@@ -20,9 +20,9 @@
     <p:sldId id="289" r:id="rId11"/>
     <p:sldId id="293" r:id="rId12"/>
     <p:sldId id="269" r:id="rId13"/>
-    <p:sldId id="265" r:id="rId14"/>
-    <p:sldId id="272" r:id="rId15"/>
-    <p:sldId id="263" r:id="rId16"/>
+    <p:sldId id="263" r:id="rId14"/>
+    <p:sldId id="265" r:id="rId15"/>
+    <p:sldId id="272" r:id="rId16"/>
     <p:sldId id="277" r:id="rId17"/>
     <p:sldId id="278" r:id="rId18"/>
     <p:sldId id="285" r:id="rId19"/>
@@ -2642,6 +2642,156 @@
   <p:cSld>
     <p:spTree>
       <p:nvGrpSpPr>
+        <p:cNvPr id="1" name="Shape 162"/>
+        <p:cNvGrpSpPr/>
+        <p:nvPr/>
+      </p:nvGrpSpPr>
+      <p:grpSpPr>
+        <a:xfrm>
+          <a:off x="0" y="0"/>
+          <a:ext cx="0" cy="0"/>
+          <a:chOff x="0" y="0"/>
+          <a:chExt cx="0" cy="0"/>
+        </a:xfrm>
+      </p:grpSpPr>
+      <p:sp>
+        <p:nvSpPr>
+          <p:cNvPr id="163" name="Google Shape;163;g4372e70eba_0_34:notes"/>
+          <p:cNvSpPr>
+            <a:spLocks noGrp="1" noRot="1" noChangeAspect="1"/>
+          </p:cNvSpPr>
+          <p:nvPr>
+            <p:ph type="sldImg" idx="2"/>
+          </p:nvPr>
+        </p:nvSpPr>
+        <p:spPr>
+          <a:xfrm>
+            <a:off x="1143000" y="685800"/>
+            <a:ext cx="4572000" cy="3429000"/>
+          </a:xfrm>
+          <a:custGeom>
+            <a:avLst/>
+            <a:gdLst/>
+            <a:ahLst/>
+            <a:cxnLst/>
+            <a:rect l="l" t="t" r="r" b="b"/>
+            <a:pathLst>
+              <a:path w="120000" h="120000" extrusionOk="0">
+                <a:moveTo>
+                  <a:pt x="0" y="0"/>
+                </a:moveTo>
+                <a:lnTo>
+                  <a:pt x="120000" y="0"/>
+                </a:lnTo>
+                <a:lnTo>
+                  <a:pt x="120000" y="120000"/>
+                </a:lnTo>
+                <a:lnTo>
+                  <a:pt x="0" y="120000"/>
+                </a:lnTo>
+                <a:close/>
+              </a:path>
+            </a:pathLst>
+          </a:custGeom>
+        </p:spPr>
+      </p:sp>
+      <p:sp>
+        <p:nvSpPr>
+          <p:cNvPr id="164" name="Google Shape;164;g4372e70eba_0_34:notes"/>
+          <p:cNvSpPr txBox="1">
+            <a:spLocks noGrp="1"/>
+          </p:cNvSpPr>
+          <p:nvPr>
+            <p:ph type="body" idx="1"/>
+          </p:nvPr>
+        </p:nvSpPr>
+        <p:spPr>
+          <a:xfrm>
+            <a:off x="685800" y="4343400"/>
+            <a:ext cx="5486400" cy="4114800"/>
+          </a:xfrm>
+          <a:prstGeom prst="rect">
+            <a:avLst/>
+          </a:prstGeom>
+        </p:spPr>
+        <p:txBody>
+          <a:bodyPr spcFirstLastPara="1" wrap="square" lIns="91425" tIns="45700" rIns="91425" bIns="45700" anchor="t" anchorCtr="0">
+            <a:noAutofit/>
+          </a:bodyPr>
+          <a:lstStyle/>
+          <a:p>
+            <a:pPr marL="0" lvl="0" indent="0" algn="l" rtl="0">
+              <a:spcBef>
+                <a:spcPts val="0"/>
+              </a:spcBef>
+              <a:spcAft>
+                <a:spcPts val="0"/>
+              </a:spcAft>
+              <a:buNone/>
+            </a:pPr>
+            <a:endParaRPr/>
+          </a:p>
+        </p:txBody>
+      </p:sp>
+      <p:sp>
+        <p:nvSpPr>
+          <p:cNvPr id="165" name="Google Shape;165;g4372e70eba_0_34:notes"/>
+          <p:cNvSpPr txBox="1">
+            <a:spLocks noGrp="1"/>
+          </p:cNvSpPr>
+          <p:nvPr>
+            <p:ph type="sldNum" idx="12"/>
+          </p:nvPr>
+        </p:nvSpPr>
+        <p:spPr>
+          <a:xfrm>
+            <a:off x="3884613" y="8685213"/>
+            <a:ext cx="2971800" cy="457200"/>
+          </a:xfrm>
+          <a:prstGeom prst="rect">
+            <a:avLst/>
+          </a:prstGeom>
+        </p:spPr>
+        <p:txBody>
+          <a:bodyPr spcFirstLastPara="1" wrap="square" lIns="91425" tIns="45700" rIns="91425" bIns="45700" anchor="b" anchorCtr="0">
+            <a:noAutofit/>
+          </a:bodyPr>
+          <a:lstStyle/>
+          <a:p>
+            <a:pPr marL="0" lvl="0" indent="0" algn="r" rtl="0">
+              <a:spcBef>
+                <a:spcPts val="0"/>
+              </a:spcBef>
+              <a:spcAft>
+                <a:spcPts val="0"/>
+              </a:spcAft>
+              <a:buClr>
+                <a:srgbClr val="000000"/>
+              </a:buClr>
+              <a:buFont typeface="Arial"/>
+              <a:buNone/>
+            </a:pPr>
+            <a:fld id="{00000000-1234-1234-1234-123412341234}" type="slidenum">
+              <a:rPr lang="pl-PL"/>
+              <a:t>12</a:t>
+            </a:fld>
+            <a:endParaRPr/>
+          </a:p>
+        </p:txBody>
+      </p:sp>
+    </p:spTree>
+  </p:cSld>
+  <p:clrMapOvr>
+    <a:masterClrMapping/>
+  </p:clrMapOvr>
+</p:notes>
+</file>
+
+<file path=ppt/notesSlides/notesSlide12.xml><?xml version="1.0" encoding="utf-8"?>
+<p:notes xmlns:a="http://schemas.openxmlformats.org/drawingml/2006/main" xmlns:r="http://schemas.openxmlformats.org/officeDocument/2006/relationships" xmlns:p="http://schemas.openxmlformats.org/presentationml/2006/main" showMasterSp="0" showMasterPhAnim="0">
+  <p:cSld>
+    <p:spTree>
+      <p:nvGrpSpPr>
         <p:cNvPr id="1" name="Shape 180"/>
         <p:cNvGrpSpPr/>
         <p:nvPr/>
@@ -2773,7 +2923,7 @@
             </a:pPr>
             <a:fld id="{00000000-1234-1234-1234-123412341234}" type="slidenum">
               <a:rPr lang="pl-PL"/>
-              <a:t>12</a:t>
+              <a:t>13</a:t>
             </a:fld>
             <a:endParaRPr/>
           </a:p>
@@ -2787,7 +2937,7 @@
 </p:notes>
 </file>
 
-<file path=ppt/notesSlides/notesSlide12.xml><?xml version="1.0" encoding="utf-8"?>
+<file path=ppt/notesSlides/notesSlide13.xml><?xml version="1.0" encoding="utf-8"?>
 <p:notes xmlns:a="http://schemas.openxmlformats.org/drawingml/2006/main" xmlns:r="http://schemas.openxmlformats.org/officeDocument/2006/relationships" xmlns:p="http://schemas.openxmlformats.org/presentationml/2006/main" showMasterSp="0" showMasterPhAnim="0">
   <p:cSld>
     <p:spTree>
@@ -2886,156 +3036,6 @@
       <p:sp>
         <p:nvSpPr>
           <p:cNvPr id="241" name="Google Shape;241;g43890d43db_0_0:notes"/>
-          <p:cNvSpPr txBox="1">
-            <a:spLocks noGrp="1"/>
-          </p:cNvSpPr>
-          <p:nvPr>
-            <p:ph type="sldNum" idx="12"/>
-          </p:nvPr>
-        </p:nvSpPr>
-        <p:spPr>
-          <a:xfrm>
-            <a:off x="3884613" y="8685213"/>
-            <a:ext cx="2971800" cy="457200"/>
-          </a:xfrm>
-          <a:prstGeom prst="rect">
-            <a:avLst/>
-          </a:prstGeom>
-        </p:spPr>
-        <p:txBody>
-          <a:bodyPr spcFirstLastPara="1" wrap="square" lIns="91425" tIns="45700" rIns="91425" bIns="45700" anchor="b" anchorCtr="0">
-            <a:noAutofit/>
-          </a:bodyPr>
-          <a:lstStyle/>
-          <a:p>
-            <a:pPr marL="0" lvl="0" indent="0" algn="r" rtl="0">
-              <a:spcBef>
-                <a:spcPts val="0"/>
-              </a:spcBef>
-              <a:spcAft>
-                <a:spcPts val="0"/>
-              </a:spcAft>
-              <a:buClr>
-                <a:srgbClr val="000000"/>
-              </a:buClr>
-              <a:buFont typeface="Arial"/>
-              <a:buNone/>
-            </a:pPr>
-            <a:fld id="{00000000-1234-1234-1234-123412341234}" type="slidenum">
-              <a:rPr lang="pl-PL"/>
-              <a:t>13</a:t>
-            </a:fld>
-            <a:endParaRPr/>
-          </a:p>
-        </p:txBody>
-      </p:sp>
-    </p:spTree>
-  </p:cSld>
-  <p:clrMapOvr>
-    <a:masterClrMapping/>
-  </p:clrMapOvr>
-</p:notes>
-</file>
-
-<file path=ppt/notesSlides/notesSlide13.xml><?xml version="1.0" encoding="utf-8"?>
-<p:notes xmlns:a="http://schemas.openxmlformats.org/drawingml/2006/main" xmlns:r="http://schemas.openxmlformats.org/officeDocument/2006/relationships" xmlns:p="http://schemas.openxmlformats.org/presentationml/2006/main" showMasterSp="0" showMasterPhAnim="0">
-  <p:cSld>
-    <p:spTree>
-      <p:nvGrpSpPr>
-        <p:cNvPr id="1" name="Shape 162"/>
-        <p:cNvGrpSpPr/>
-        <p:nvPr/>
-      </p:nvGrpSpPr>
-      <p:grpSpPr>
-        <a:xfrm>
-          <a:off x="0" y="0"/>
-          <a:ext cx="0" cy="0"/>
-          <a:chOff x="0" y="0"/>
-          <a:chExt cx="0" cy="0"/>
-        </a:xfrm>
-      </p:grpSpPr>
-      <p:sp>
-        <p:nvSpPr>
-          <p:cNvPr id="163" name="Google Shape;163;g4372e70eba_0_34:notes"/>
-          <p:cNvSpPr>
-            <a:spLocks noGrp="1" noRot="1" noChangeAspect="1"/>
-          </p:cNvSpPr>
-          <p:nvPr>
-            <p:ph type="sldImg" idx="2"/>
-          </p:nvPr>
-        </p:nvSpPr>
-        <p:spPr>
-          <a:xfrm>
-            <a:off x="1143000" y="685800"/>
-            <a:ext cx="4572000" cy="3429000"/>
-          </a:xfrm>
-          <a:custGeom>
-            <a:avLst/>
-            <a:gdLst/>
-            <a:ahLst/>
-            <a:cxnLst/>
-            <a:rect l="l" t="t" r="r" b="b"/>
-            <a:pathLst>
-              <a:path w="120000" h="120000" extrusionOk="0">
-                <a:moveTo>
-                  <a:pt x="0" y="0"/>
-                </a:moveTo>
-                <a:lnTo>
-                  <a:pt x="120000" y="0"/>
-                </a:lnTo>
-                <a:lnTo>
-                  <a:pt x="120000" y="120000"/>
-                </a:lnTo>
-                <a:lnTo>
-                  <a:pt x="0" y="120000"/>
-                </a:lnTo>
-                <a:close/>
-              </a:path>
-            </a:pathLst>
-          </a:custGeom>
-        </p:spPr>
-      </p:sp>
-      <p:sp>
-        <p:nvSpPr>
-          <p:cNvPr id="164" name="Google Shape;164;g4372e70eba_0_34:notes"/>
-          <p:cNvSpPr txBox="1">
-            <a:spLocks noGrp="1"/>
-          </p:cNvSpPr>
-          <p:nvPr>
-            <p:ph type="body" idx="1"/>
-          </p:nvPr>
-        </p:nvSpPr>
-        <p:spPr>
-          <a:xfrm>
-            <a:off x="685800" y="4343400"/>
-            <a:ext cx="5486400" cy="4114800"/>
-          </a:xfrm>
-          <a:prstGeom prst="rect">
-            <a:avLst/>
-          </a:prstGeom>
-        </p:spPr>
-        <p:txBody>
-          <a:bodyPr spcFirstLastPara="1" wrap="square" lIns="91425" tIns="45700" rIns="91425" bIns="45700" anchor="t" anchorCtr="0">
-            <a:noAutofit/>
-          </a:bodyPr>
-          <a:lstStyle/>
-          <a:p>
-            <a:pPr marL="0" lvl="0" indent="0" algn="l" rtl="0">
-              <a:spcBef>
-                <a:spcPts val="0"/>
-              </a:spcBef>
-              <a:spcAft>
-                <a:spcPts val="0"/>
-              </a:spcAft>
-              <a:buNone/>
-            </a:pPr>
-            <a:endParaRPr/>
-          </a:p>
-        </p:txBody>
-      </p:sp>
-      <p:sp>
-        <p:nvSpPr>
-          <p:cNvPr id="165" name="Google Shape;165;g4372e70eba_0_34:notes"/>
           <p:cNvSpPr txBox="1">
             <a:spLocks noGrp="1"/>
           </p:cNvSpPr>
@@ -26401,430 +26401,6 @@
   <p:cSld>
     <p:spTree>
       <p:nvGrpSpPr>
-        <p:cNvPr id="1" name="Shape 184"/>
-        <p:cNvGrpSpPr/>
-        <p:nvPr/>
-      </p:nvGrpSpPr>
-      <p:grpSpPr>
-        <a:xfrm>
-          <a:off x="0" y="0"/>
-          <a:ext cx="0" cy="0"/>
-          <a:chOff x="0" y="0"/>
-          <a:chExt cx="0" cy="0"/>
-        </a:xfrm>
-      </p:grpSpPr>
-      <p:sp>
-        <p:nvSpPr>
-          <p:cNvPr id="185" name="Google Shape;185;p34"/>
-          <p:cNvSpPr txBox="1">
-            <a:spLocks noGrp="1"/>
-          </p:cNvSpPr>
-          <p:nvPr>
-            <p:ph type="body" idx="1"/>
-          </p:nvPr>
-        </p:nvSpPr>
-        <p:spPr>
-          <a:xfrm>
-            <a:off x="686344" y="1982481"/>
-            <a:ext cx="7778100" cy="4119000"/>
-          </a:xfrm>
-          <a:prstGeom prst="rect">
-            <a:avLst/>
-          </a:prstGeom>
-        </p:spPr>
-        <p:txBody>
-          <a:bodyPr spcFirstLastPara="1" wrap="square" lIns="52125" tIns="52125" rIns="52125" bIns="52125" anchor="t" anchorCtr="0">
-            <a:noAutofit/>
-          </a:bodyPr>
-          <a:lstStyle/>
-          <a:p>
-            <a:pPr marL="457200" lvl="0" indent="-381000" algn="l" rtl="0">
-              <a:spcBef>
-                <a:spcPts val="0"/>
-              </a:spcBef>
-              <a:spcAft>
-                <a:spcPts val="0"/>
-              </a:spcAft>
-              <a:buSzPts val="2400"/>
-              <a:buChar char="»"/>
-            </a:pPr>
-            <a:r>
-              <a:rPr lang="pl-PL" sz="2400" dirty="0"/>
-              <a:t>Operator sieci telefonii komórkowej:</a:t>
-            </a:r>
-            <a:endParaRPr sz="2400" dirty="0"/>
-          </a:p>
-          <a:p>
-            <a:pPr marL="914400" lvl="1" indent="-381000" algn="l" rtl="0">
-              <a:spcBef>
-                <a:spcPts val="0"/>
-              </a:spcBef>
-              <a:spcAft>
-                <a:spcPts val="0"/>
-              </a:spcAft>
-              <a:buSzPts val="2400"/>
-              <a:buChar char="–"/>
-            </a:pPr>
-            <a:r>
-              <a:rPr lang="pl-PL" sz="2400" dirty="0"/>
-              <a:t>GSM 900/1800</a:t>
-            </a:r>
-            <a:endParaRPr sz="2400" dirty="0"/>
-          </a:p>
-          <a:p>
-            <a:pPr marL="914400" lvl="1" indent="-381000" algn="l" rtl="0">
-              <a:spcBef>
-                <a:spcPts val="0"/>
-              </a:spcBef>
-              <a:spcAft>
-                <a:spcPts val="0"/>
-              </a:spcAft>
-              <a:buSzPts val="2400"/>
-              <a:buChar char="–"/>
-            </a:pPr>
-            <a:r>
-              <a:rPr lang="pl-PL" sz="2400" dirty="0"/>
-              <a:t>UMTS 900/2100</a:t>
-            </a:r>
-            <a:endParaRPr sz="2400" dirty="0"/>
-          </a:p>
-          <a:p>
-            <a:pPr marL="914400" lvl="1" indent="-381000" algn="l" rtl="0">
-              <a:spcBef>
-                <a:spcPts val="0"/>
-              </a:spcBef>
-              <a:spcAft>
-                <a:spcPts val="0"/>
-              </a:spcAft>
-              <a:buSzPts val="2400"/>
-              <a:buChar char="–"/>
-            </a:pPr>
-            <a:r>
-              <a:rPr lang="pl-PL" sz="2400" dirty="0"/>
-              <a:t>LTE 800/1800/2600</a:t>
-            </a:r>
-            <a:endParaRPr sz="2400" dirty="0"/>
-          </a:p>
-          <a:p>
-            <a:pPr marL="457200" lvl="0" indent="-381000" algn="l" rtl="0">
-              <a:spcBef>
-                <a:spcPts val="0"/>
-              </a:spcBef>
-              <a:spcAft>
-                <a:spcPts val="0"/>
-              </a:spcAft>
-              <a:buSzPts val="2400"/>
-              <a:buChar char="»"/>
-            </a:pPr>
-            <a:r>
-              <a:rPr lang="pl-PL" sz="2400" dirty="0"/>
-              <a:t>Obecnie 4. operator komórkowy w Polsce pod względem liczby abonentów, obsługujący ponad 12 mln klientów</a:t>
-            </a:r>
-            <a:endParaRPr sz="2400" dirty="0"/>
-          </a:p>
-          <a:p>
-            <a:pPr marL="457200" lvl="0" indent="-381000" algn="l" rtl="0">
-              <a:spcBef>
-                <a:spcPts val="0"/>
-              </a:spcBef>
-              <a:spcAft>
-                <a:spcPts val="0"/>
-              </a:spcAft>
-              <a:buSzPts val="2400"/>
-              <a:buChar char="»"/>
-            </a:pPr>
-            <a:r>
-              <a:rPr lang="pl-PL" sz="2400" dirty="0"/>
-              <a:t>Usługi telekomunikacyjne dla klientów indywidualnych i biznesowych</a:t>
-            </a:r>
-            <a:endParaRPr sz="2400" dirty="0"/>
-          </a:p>
-          <a:p>
-            <a:pPr marL="457200" lvl="0" indent="-381000" algn="l" rtl="0">
-              <a:spcBef>
-                <a:spcPts val="0"/>
-              </a:spcBef>
-              <a:spcAft>
-                <a:spcPts val="0"/>
-              </a:spcAft>
-              <a:buSzPts val="2400"/>
-              <a:buChar char="»"/>
-            </a:pPr>
-            <a:r>
-              <a:rPr lang="pl-PL" sz="2400" dirty="0" err="1">
-                <a:solidFill>
-                  <a:schemeClr val="dk1"/>
-                </a:solidFill>
-              </a:rPr>
-              <a:t>hub:raum</a:t>
-            </a:r>
-            <a:endParaRPr sz="2400" dirty="0"/>
-          </a:p>
-        </p:txBody>
-      </p:sp>
-      <p:sp>
-        <p:nvSpPr>
-          <p:cNvPr id="186" name="Google Shape;186;p34"/>
-          <p:cNvSpPr txBox="1">
-            <a:spLocks noGrp="1"/>
-          </p:cNvSpPr>
-          <p:nvPr>
-            <p:ph type="sldNum" idx="12"/>
-          </p:nvPr>
-        </p:nvSpPr>
-        <p:spPr>
-          <a:xfrm>
-            <a:off x="7850596" y="6254325"/>
-            <a:ext cx="613800" cy="295500"/>
-          </a:xfrm>
-          <a:prstGeom prst="rect">
-            <a:avLst/>
-          </a:prstGeom>
-        </p:spPr>
-        <p:txBody>
-          <a:bodyPr spcFirstLastPara="1" wrap="square" lIns="52125" tIns="52125" rIns="52125" bIns="52125" anchor="t" anchorCtr="0">
-            <a:noAutofit/>
-          </a:bodyPr>
-          <a:lstStyle/>
-          <a:p>
-            <a:pPr marL="0" lvl="0" indent="0" algn="r" rtl="0">
-              <a:spcBef>
-                <a:spcPts val="0"/>
-              </a:spcBef>
-              <a:spcAft>
-                <a:spcPts val="0"/>
-              </a:spcAft>
-              <a:buClr>
-                <a:srgbClr val="000000"/>
-              </a:buClr>
-              <a:buFont typeface="Arial"/>
-              <a:buNone/>
-            </a:pPr>
-            <a:fld id="{00000000-1234-1234-1234-123412341234}" type="slidenum">
-              <a:rPr lang="pl-PL"/>
-              <a:t>12</a:t>
-            </a:fld>
-            <a:endParaRPr/>
-          </a:p>
-        </p:txBody>
-      </p:sp>
-      <p:pic>
-        <p:nvPicPr>
-          <p:cNvPr id="187" name="Google Shape;187;p34"/>
-          <p:cNvPicPr preferRelativeResize="0"/>
-          <p:nvPr/>
-        </p:nvPicPr>
-        <p:blipFill>
-          <a:blip r:embed="rId3">
-            <a:alphaModFix/>
-          </a:blip>
-          <a:stretch>
-            <a:fillRect/>
-          </a:stretch>
-        </p:blipFill>
-        <p:spPr>
-          <a:xfrm>
-            <a:off x="3408924" y="609450"/>
-            <a:ext cx="2326155" cy="1143900"/>
-          </a:xfrm>
-          <a:prstGeom prst="rect">
-            <a:avLst/>
-          </a:prstGeom>
-          <a:noFill/>
-          <a:ln>
-            <a:noFill/>
-          </a:ln>
-        </p:spPr>
-      </p:pic>
-    </p:spTree>
-  </p:cSld>
-  <p:clrMapOvr>
-    <a:masterClrMapping/>
-  </p:clrMapOvr>
-</p:sld>
-</file>
-
-<file path=ppt/slides/slide13.xml><?xml version="1.0" encoding="utf-8"?>
-<p:sld xmlns:a="http://schemas.openxmlformats.org/drawingml/2006/main" xmlns:r="http://schemas.openxmlformats.org/officeDocument/2006/relationships" xmlns:p="http://schemas.openxmlformats.org/presentationml/2006/main">
-  <p:cSld>
-    <p:spTree>
-      <p:nvGrpSpPr>
-        <p:cNvPr id="1" name="Shape 242"/>
-        <p:cNvGrpSpPr/>
-        <p:nvPr/>
-      </p:nvGrpSpPr>
-      <p:grpSpPr>
-        <a:xfrm>
-          <a:off x="0" y="0"/>
-          <a:ext cx="0" cy="0"/>
-          <a:chOff x="0" y="0"/>
-          <a:chExt cx="0" cy="0"/>
-        </a:xfrm>
-      </p:grpSpPr>
-      <p:sp>
-        <p:nvSpPr>
-          <p:cNvPr id="243" name="Google Shape;243;p41"/>
-          <p:cNvSpPr txBox="1">
-            <a:spLocks noGrp="1"/>
-          </p:cNvSpPr>
-          <p:nvPr>
-            <p:ph type="body" idx="1"/>
-          </p:nvPr>
-        </p:nvSpPr>
-        <p:spPr>
-          <a:xfrm>
-            <a:off x="686350" y="1982475"/>
-            <a:ext cx="7778100" cy="4119000"/>
-          </a:xfrm>
-          <a:prstGeom prst="rect">
-            <a:avLst/>
-          </a:prstGeom>
-        </p:spPr>
-        <p:txBody>
-          <a:bodyPr spcFirstLastPara="1" wrap="square" lIns="52125" tIns="52125" rIns="52125" bIns="52125" anchor="t" anchorCtr="0">
-            <a:normAutofit lnSpcReduction="10000"/>
-          </a:bodyPr>
-          <a:lstStyle/>
-          <a:p>
-            <a:pPr marL="457200" lvl="0" indent="-381000" algn="l" rtl="0">
-              <a:spcBef>
-                <a:spcPts val="0"/>
-              </a:spcBef>
-              <a:spcAft>
-                <a:spcPts val="0"/>
-              </a:spcAft>
-              <a:buSzPts val="2400"/>
-              <a:buChar char="»"/>
-            </a:pPr>
-            <a:r>
-              <a:rPr lang="pl-PL" sz="2400" dirty="0"/>
-              <a:t>Od 2000 r. Krakowskie Centrum Techniczne Aptiv wspiera największe marki samochodowe, łącząc branżę motoryzacyjną z nowoczesnymi technologiami</a:t>
-            </a:r>
-            <a:endParaRPr sz="2400" dirty="0"/>
-          </a:p>
-          <a:p>
-            <a:pPr marL="457200" lvl="0" indent="-381000" algn="l" rtl="0">
-              <a:spcBef>
-                <a:spcPts val="0"/>
-              </a:spcBef>
-              <a:spcAft>
-                <a:spcPts val="0"/>
-              </a:spcAft>
-              <a:buSzPts val="2400"/>
-              <a:buChar char="»"/>
-            </a:pPr>
-            <a:r>
-              <a:rPr lang="pl-PL" sz="2400" dirty="0"/>
-              <a:t>Od elektroniki i systemów aktywnego bezpieczeństwa po najnowocześniejsze multimedia dla kierowców. Inżynierowie z krakowskiego ośrodka badawczo-rozwojowego Aptiv tworzą na co dzień technologie dla aut przyszłości</a:t>
-            </a:r>
-            <a:endParaRPr sz="2400" dirty="0"/>
-          </a:p>
-          <a:p>
-            <a:pPr marL="457200" lvl="0" indent="-381000" algn="l" rtl="0">
-              <a:spcBef>
-                <a:spcPts val="0"/>
-              </a:spcBef>
-              <a:spcAft>
-                <a:spcPts val="0"/>
-              </a:spcAft>
-              <a:buSzPts val="2400"/>
-              <a:buChar char="»"/>
-            </a:pPr>
-            <a:r>
-              <a:rPr lang="pl-PL" sz="2400" dirty="0"/>
-              <a:t>Aptiv w Krakowie zatrudnia dziś ponad 2500 pracowników, w tym 1800 inżynierów</a:t>
-            </a:r>
-            <a:endParaRPr sz="2400" dirty="0"/>
-          </a:p>
-        </p:txBody>
-      </p:sp>
-      <p:sp>
-        <p:nvSpPr>
-          <p:cNvPr id="244" name="Google Shape;244;p41"/>
-          <p:cNvSpPr txBox="1">
-            <a:spLocks noGrp="1"/>
-          </p:cNvSpPr>
-          <p:nvPr>
-            <p:ph type="sldNum" idx="12"/>
-          </p:nvPr>
-        </p:nvSpPr>
-        <p:spPr>
-          <a:xfrm>
-            <a:off x="7737794" y="6254325"/>
-            <a:ext cx="726600" cy="295500"/>
-          </a:xfrm>
-          <a:prstGeom prst="rect">
-            <a:avLst/>
-          </a:prstGeom>
-        </p:spPr>
-        <p:txBody>
-          <a:bodyPr spcFirstLastPara="1" wrap="square" lIns="52125" tIns="52125" rIns="52125" bIns="52125" anchor="t" anchorCtr="0">
-            <a:noAutofit/>
-          </a:bodyPr>
-          <a:lstStyle/>
-          <a:p>
-            <a:pPr marL="0" lvl="0" indent="0" algn="r" rtl="0">
-              <a:spcBef>
-                <a:spcPts val="0"/>
-              </a:spcBef>
-              <a:spcAft>
-                <a:spcPts val="0"/>
-              </a:spcAft>
-              <a:buClr>
-                <a:srgbClr val="000000"/>
-              </a:buClr>
-              <a:buFont typeface="Arial"/>
-              <a:buNone/>
-            </a:pPr>
-            <a:fld id="{00000000-1234-1234-1234-123412341234}" type="slidenum">
-              <a:rPr lang="pl-PL"/>
-              <a:t>13</a:t>
-            </a:fld>
-            <a:endParaRPr/>
-          </a:p>
-        </p:txBody>
-      </p:sp>
-      <p:pic>
-        <p:nvPicPr>
-          <p:cNvPr id="245" name="Google Shape;245;p41"/>
-          <p:cNvPicPr preferRelativeResize="0"/>
-          <p:nvPr/>
-        </p:nvPicPr>
-        <p:blipFill>
-          <a:blip r:embed="rId3">
-            <a:alphaModFix/>
-          </a:blip>
-          <a:stretch>
-            <a:fillRect/>
-          </a:stretch>
-        </p:blipFill>
-        <p:spPr>
-          <a:xfrm>
-            <a:off x="686475" y="681662"/>
-            <a:ext cx="7777850" cy="999475"/>
-          </a:xfrm>
-          <a:prstGeom prst="rect">
-            <a:avLst/>
-          </a:prstGeom>
-          <a:noFill/>
-          <a:ln>
-            <a:noFill/>
-          </a:ln>
-        </p:spPr>
-      </p:pic>
-    </p:spTree>
-  </p:cSld>
-  <p:clrMapOvr>
-    <a:masterClrMapping/>
-  </p:clrMapOvr>
-</p:sld>
-</file>
-
-<file path=ppt/slides/slide14.xml><?xml version="1.0" encoding="utf-8"?>
-<p:sld xmlns:a="http://schemas.openxmlformats.org/drawingml/2006/main" xmlns:r="http://schemas.openxmlformats.org/officeDocument/2006/relationships" xmlns:p="http://schemas.openxmlformats.org/presentationml/2006/main">
-  <p:cSld>
-    <p:spTree>
-      <p:nvGrpSpPr>
         <p:cNvPr id="1" name="Shape 166"/>
         <p:cNvGrpSpPr/>
         <p:nvPr/>
@@ -26975,7 +26551,7 @@
             </a:pPr>
             <a:fld id="{00000000-1234-1234-1234-123412341234}" type="slidenum">
               <a:rPr lang="pl-PL"/>
-              <a:t>14</a:t>
+              <a:t>12</a:t>
             </a:fld>
             <a:endParaRPr dirty="0"/>
           </a:p>
@@ -27026,6 +26602,430 @@
               </a14:hiddenFill>
             </a:ext>
           </a:extLst>
+        </p:spPr>
+      </p:pic>
+    </p:spTree>
+  </p:cSld>
+  <p:clrMapOvr>
+    <a:masterClrMapping/>
+  </p:clrMapOvr>
+</p:sld>
+</file>
+
+<file path=ppt/slides/slide13.xml><?xml version="1.0" encoding="utf-8"?>
+<p:sld xmlns:a="http://schemas.openxmlformats.org/drawingml/2006/main" xmlns:r="http://schemas.openxmlformats.org/officeDocument/2006/relationships" xmlns:p="http://schemas.openxmlformats.org/presentationml/2006/main">
+  <p:cSld>
+    <p:spTree>
+      <p:nvGrpSpPr>
+        <p:cNvPr id="1" name="Shape 184"/>
+        <p:cNvGrpSpPr/>
+        <p:nvPr/>
+      </p:nvGrpSpPr>
+      <p:grpSpPr>
+        <a:xfrm>
+          <a:off x="0" y="0"/>
+          <a:ext cx="0" cy="0"/>
+          <a:chOff x="0" y="0"/>
+          <a:chExt cx="0" cy="0"/>
+        </a:xfrm>
+      </p:grpSpPr>
+      <p:sp>
+        <p:nvSpPr>
+          <p:cNvPr id="185" name="Google Shape;185;p34"/>
+          <p:cNvSpPr txBox="1">
+            <a:spLocks noGrp="1"/>
+          </p:cNvSpPr>
+          <p:nvPr>
+            <p:ph type="body" idx="1"/>
+          </p:nvPr>
+        </p:nvSpPr>
+        <p:spPr>
+          <a:xfrm>
+            <a:off x="686344" y="1982481"/>
+            <a:ext cx="7778100" cy="4119000"/>
+          </a:xfrm>
+          <a:prstGeom prst="rect">
+            <a:avLst/>
+          </a:prstGeom>
+        </p:spPr>
+        <p:txBody>
+          <a:bodyPr spcFirstLastPara="1" wrap="square" lIns="52125" tIns="52125" rIns="52125" bIns="52125" anchor="t" anchorCtr="0">
+            <a:noAutofit/>
+          </a:bodyPr>
+          <a:lstStyle/>
+          <a:p>
+            <a:pPr marL="457200" lvl="0" indent="-381000" algn="l" rtl="0">
+              <a:spcBef>
+                <a:spcPts val="0"/>
+              </a:spcBef>
+              <a:spcAft>
+                <a:spcPts val="0"/>
+              </a:spcAft>
+              <a:buSzPts val="2400"/>
+              <a:buChar char="»"/>
+            </a:pPr>
+            <a:r>
+              <a:rPr lang="pl-PL" sz="2400" dirty="0"/>
+              <a:t>Operator sieci telefonii komórkowej:</a:t>
+            </a:r>
+            <a:endParaRPr sz="2400" dirty="0"/>
+          </a:p>
+          <a:p>
+            <a:pPr marL="914400" lvl="1" indent="-381000" algn="l" rtl="0">
+              <a:spcBef>
+                <a:spcPts val="0"/>
+              </a:spcBef>
+              <a:spcAft>
+                <a:spcPts val="0"/>
+              </a:spcAft>
+              <a:buSzPts val="2400"/>
+              <a:buChar char="–"/>
+            </a:pPr>
+            <a:r>
+              <a:rPr lang="pl-PL" sz="2400" dirty="0"/>
+              <a:t>GSM 900/1800</a:t>
+            </a:r>
+            <a:endParaRPr sz="2400" dirty="0"/>
+          </a:p>
+          <a:p>
+            <a:pPr marL="914400" lvl="1" indent="-381000" algn="l" rtl="0">
+              <a:spcBef>
+                <a:spcPts val="0"/>
+              </a:spcBef>
+              <a:spcAft>
+                <a:spcPts val="0"/>
+              </a:spcAft>
+              <a:buSzPts val="2400"/>
+              <a:buChar char="–"/>
+            </a:pPr>
+            <a:r>
+              <a:rPr lang="pl-PL" sz="2400" dirty="0"/>
+              <a:t>UMTS 900/2100</a:t>
+            </a:r>
+            <a:endParaRPr sz="2400" dirty="0"/>
+          </a:p>
+          <a:p>
+            <a:pPr marL="914400" lvl="1" indent="-381000" algn="l" rtl="0">
+              <a:spcBef>
+                <a:spcPts val="0"/>
+              </a:spcBef>
+              <a:spcAft>
+                <a:spcPts val="0"/>
+              </a:spcAft>
+              <a:buSzPts val="2400"/>
+              <a:buChar char="–"/>
+            </a:pPr>
+            <a:r>
+              <a:rPr lang="pl-PL" sz="2400" dirty="0"/>
+              <a:t>LTE 800/1800/2600</a:t>
+            </a:r>
+            <a:endParaRPr sz="2400" dirty="0"/>
+          </a:p>
+          <a:p>
+            <a:pPr marL="457200" lvl="0" indent="-381000" algn="l" rtl="0">
+              <a:spcBef>
+                <a:spcPts val="0"/>
+              </a:spcBef>
+              <a:spcAft>
+                <a:spcPts val="0"/>
+              </a:spcAft>
+              <a:buSzPts val="2400"/>
+              <a:buChar char="»"/>
+            </a:pPr>
+            <a:r>
+              <a:rPr lang="pl-PL" sz="2400" dirty="0"/>
+              <a:t>Obecnie 4. operator komórkowy w Polsce pod względem liczby abonentów, obsługujący ponad 12 mln klientów</a:t>
+            </a:r>
+            <a:endParaRPr sz="2400" dirty="0"/>
+          </a:p>
+          <a:p>
+            <a:pPr marL="457200" lvl="0" indent="-381000" algn="l" rtl="0">
+              <a:spcBef>
+                <a:spcPts val="0"/>
+              </a:spcBef>
+              <a:spcAft>
+                <a:spcPts val="0"/>
+              </a:spcAft>
+              <a:buSzPts val="2400"/>
+              <a:buChar char="»"/>
+            </a:pPr>
+            <a:r>
+              <a:rPr lang="pl-PL" sz="2400" dirty="0"/>
+              <a:t>Usługi telekomunikacyjne dla klientów indywidualnych i biznesowych</a:t>
+            </a:r>
+            <a:endParaRPr sz="2400" dirty="0"/>
+          </a:p>
+          <a:p>
+            <a:pPr marL="457200" lvl="0" indent="-381000" algn="l" rtl="0">
+              <a:spcBef>
+                <a:spcPts val="0"/>
+              </a:spcBef>
+              <a:spcAft>
+                <a:spcPts val="0"/>
+              </a:spcAft>
+              <a:buSzPts val="2400"/>
+              <a:buChar char="»"/>
+            </a:pPr>
+            <a:r>
+              <a:rPr lang="pl-PL" sz="2400" dirty="0" err="1">
+                <a:solidFill>
+                  <a:schemeClr val="dk1"/>
+                </a:solidFill>
+              </a:rPr>
+              <a:t>hub:raum</a:t>
+            </a:r>
+            <a:endParaRPr sz="2400" dirty="0"/>
+          </a:p>
+        </p:txBody>
+      </p:sp>
+      <p:sp>
+        <p:nvSpPr>
+          <p:cNvPr id="186" name="Google Shape;186;p34"/>
+          <p:cNvSpPr txBox="1">
+            <a:spLocks noGrp="1"/>
+          </p:cNvSpPr>
+          <p:nvPr>
+            <p:ph type="sldNum" idx="12"/>
+          </p:nvPr>
+        </p:nvSpPr>
+        <p:spPr>
+          <a:xfrm>
+            <a:off x="7850596" y="6254325"/>
+            <a:ext cx="613800" cy="295500"/>
+          </a:xfrm>
+          <a:prstGeom prst="rect">
+            <a:avLst/>
+          </a:prstGeom>
+        </p:spPr>
+        <p:txBody>
+          <a:bodyPr spcFirstLastPara="1" wrap="square" lIns="52125" tIns="52125" rIns="52125" bIns="52125" anchor="t" anchorCtr="0">
+            <a:noAutofit/>
+          </a:bodyPr>
+          <a:lstStyle/>
+          <a:p>
+            <a:pPr marL="0" lvl="0" indent="0" algn="r" rtl="0">
+              <a:spcBef>
+                <a:spcPts val="0"/>
+              </a:spcBef>
+              <a:spcAft>
+                <a:spcPts val="0"/>
+              </a:spcAft>
+              <a:buClr>
+                <a:srgbClr val="000000"/>
+              </a:buClr>
+              <a:buFont typeface="Arial"/>
+              <a:buNone/>
+            </a:pPr>
+            <a:fld id="{00000000-1234-1234-1234-123412341234}" type="slidenum">
+              <a:rPr lang="pl-PL"/>
+              <a:t>13</a:t>
+            </a:fld>
+            <a:endParaRPr/>
+          </a:p>
+        </p:txBody>
+      </p:sp>
+      <p:pic>
+        <p:nvPicPr>
+          <p:cNvPr id="187" name="Google Shape;187;p34"/>
+          <p:cNvPicPr preferRelativeResize="0"/>
+          <p:nvPr/>
+        </p:nvPicPr>
+        <p:blipFill>
+          <a:blip r:embed="rId3">
+            <a:alphaModFix/>
+          </a:blip>
+          <a:stretch>
+            <a:fillRect/>
+          </a:stretch>
+        </p:blipFill>
+        <p:spPr>
+          <a:xfrm>
+            <a:off x="3408924" y="609450"/>
+            <a:ext cx="2326155" cy="1143900"/>
+          </a:xfrm>
+          <a:prstGeom prst="rect">
+            <a:avLst/>
+          </a:prstGeom>
+          <a:noFill/>
+          <a:ln>
+            <a:noFill/>
+          </a:ln>
+        </p:spPr>
+      </p:pic>
+    </p:spTree>
+  </p:cSld>
+  <p:clrMapOvr>
+    <a:masterClrMapping/>
+  </p:clrMapOvr>
+</p:sld>
+</file>
+
+<file path=ppt/slides/slide14.xml><?xml version="1.0" encoding="utf-8"?>
+<p:sld xmlns:a="http://schemas.openxmlformats.org/drawingml/2006/main" xmlns:r="http://schemas.openxmlformats.org/officeDocument/2006/relationships" xmlns:p="http://schemas.openxmlformats.org/presentationml/2006/main">
+  <p:cSld>
+    <p:spTree>
+      <p:nvGrpSpPr>
+        <p:cNvPr id="1" name="Shape 242"/>
+        <p:cNvGrpSpPr/>
+        <p:nvPr/>
+      </p:nvGrpSpPr>
+      <p:grpSpPr>
+        <a:xfrm>
+          <a:off x="0" y="0"/>
+          <a:ext cx="0" cy="0"/>
+          <a:chOff x="0" y="0"/>
+          <a:chExt cx="0" cy="0"/>
+        </a:xfrm>
+      </p:grpSpPr>
+      <p:sp>
+        <p:nvSpPr>
+          <p:cNvPr id="243" name="Google Shape;243;p41"/>
+          <p:cNvSpPr txBox="1">
+            <a:spLocks noGrp="1"/>
+          </p:cNvSpPr>
+          <p:nvPr>
+            <p:ph type="body" idx="1"/>
+          </p:nvPr>
+        </p:nvSpPr>
+        <p:spPr>
+          <a:xfrm>
+            <a:off x="686350" y="1982475"/>
+            <a:ext cx="7778100" cy="4119000"/>
+          </a:xfrm>
+          <a:prstGeom prst="rect">
+            <a:avLst/>
+          </a:prstGeom>
+        </p:spPr>
+        <p:txBody>
+          <a:bodyPr spcFirstLastPara="1" wrap="square" lIns="52125" tIns="52125" rIns="52125" bIns="52125" anchor="t" anchorCtr="0">
+            <a:normAutofit lnSpcReduction="10000"/>
+          </a:bodyPr>
+          <a:lstStyle/>
+          <a:p>
+            <a:pPr marL="457200" lvl="0" indent="-381000" algn="l" rtl="0">
+              <a:spcBef>
+                <a:spcPts val="0"/>
+              </a:spcBef>
+              <a:spcAft>
+                <a:spcPts val="0"/>
+              </a:spcAft>
+              <a:buSzPts val="2400"/>
+              <a:buChar char="»"/>
+            </a:pPr>
+            <a:r>
+              <a:rPr lang="pl-PL" sz="2400" dirty="0"/>
+              <a:t>Od 2000 r. Krakowskie Centrum Techniczne Aptiv wspiera największe marki samochodowe, łącząc branżę motoryzacyjną z nowoczesnymi technologiami</a:t>
+            </a:r>
+            <a:endParaRPr sz="2400" dirty="0"/>
+          </a:p>
+          <a:p>
+            <a:pPr marL="457200" lvl="0" indent="-381000" algn="l" rtl="0">
+              <a:spcBef>
+                <a:spcPts val="0"/>
+              </a:spcBef>
+              <a:spcAft>
+                <a:spcPts val="0"/>
+              </a:spcAft>
+              <a:buSzPts val="2400"/>
+              <a:buChar char="»"/>
+            </a:pPr>
+            <a:r>
+              <a:rPr lang="pl-PL" sz="2400" dirty="0"/>
+              <a:t>Od elektroniki i systemów aktywnego bezpieczeństwa po najnowocześniejsze multimedia dla kierowców. Inżynierowie z krakowskiego ośrodka badawczo-rozwojowego Aptiv tworzą na co dzień technologie dla aut przyszłości</a:t>
+            </a:r>
+            <a:endParaRPr sz="2400" dirty="0"/>
+          </a:p>
+          <a:p>
+            <a:pPr marL="457200" lvl="0" indent="-381000" algn="l" rtl="0">
+              <a:spcBef>
+                <a:spcPts val="0"/>
+              </a:spcBef>
+              <a:spcAft>
+                <a:spcPts val="0"/>
+              </a:spcAft>
+              <a:buSzPts val="2400"/>
+              <a:buChar char="»"/>
+            </a:pPr>
+            <a:r>
+              <a:rPr lang="pl-PL" sz="2400" dirty="0"/>
+              <a:t>Aptiv w Krakowie zatrudnia dziś ponad 2500 pracowników, w tym 1800 inżynierów</a:t>
+            </a:r>
+            <a:endParaRPr sz="2400" dirty="0"/>
+          </a:p>
+        </p:txBody>
+      </p:sp>
+      <p:sp>
+        <p:nvSpPr>
+          <p:cNvPr id="244" name="Google Shape;244;p41"/>
+          <p:cNvSpPr txBox="1">
+            <a:spLocks noGrp="1"/>
+          </p:cNvSpPr>
+          <p:nvPr>
+            <p:ph type="sldNum" idx="12"/>
+          </p:nvPr>
+        </p:nvSpPr>
+        <p:spPr>
+          <a:xfrm>
+            <a:off x="7737794" y="6254325"/>
+            <a:ext cx="726600" cy="295500"/>
+          </a:xfrm>
+          <a:prstGeom prst="rect">
+            <a:avLst/>
+          </a:prstGeom>
+        </p:spPr>
+        <p:txBody>
+          <a:bodyPr spcFirstLastPara="1" wrap="square" lIns="52125" tIns="52125" rIns="52125" bIns="52125" anchor="t" anchorCtr="0">
+            <a:noAutofit/>
+          </a:bodyPr>
+          <a:lstStyle/>
+          <a:p>
+            <a:pPr marL="0" lvl="0" indent="0" algn="r" rtl="0">
+              <a:spcBef>
+                <a:spcPts val="0"/>
+              </a:spcBef>
+              <a:spcAft>
+                <a:spcPts val="0"/>
+              </a:spcAft>
+              <a:buClr>
+                <a:srgbClr val="000000"/>
+              </a:buClr>
+              <a:buFont typeface="Arial"/>
+              <a:buNone/>
+            </a:pPr>
+            <a:fld id="{00000000-1234-1234-1234-123412341234}" type="slidenum">
+              <a:rPr lang="pl-PL"/>
+              <a:t>14</a:t>
+            </a:fld>
+            <a:endParaRPr/>
+          </a:p>
+        </p:txBody>
+      </p:sp>
+      <p:pic>
+        <p:nvPicPr>
+          <p:cNvPr id="245" name="Google Shape;245;p41"/>
+          <p:cNvPicPr preferRelativeResize="0"/>
+          <p:nvPr/>
+        </p:nvPicPr>
+        <p:blipFill>
+          <a:blip r:embed="rId3">
+            <a:alphaModFix/>
+          </a:blip>
+          <a:stretch>
+            <a:fillRect/>
+          </a:stretch>
+        </p:blipFill>
+        <p:spPr>
+          <a:xfrm>
+            <a:off x="686475" y="681662"/>
+            <a:ext cx="7777850" cy="999475"/>
+          </a:xfrm>
+          <a:prstGeom prst="rect">
+            <a:avLst/>
+          </a:prstGeom>
+          <a:noFill/>
+          <a:ln>
+            <a:noFill/>
+          </a:ln>
         </p:spPr>
       </p:pic>
     </p:spTree>

</xml_diff>